<commit_message>
Updated System Engr ppt
</commit_message>
<xml_diff>
--- a/Resources/Systems Eng/OS PROJECT System Specs.pptx
+++ b/Resources/Systems Eng/OS PROJECT System Specs.pptx
@@ -7,7 +7,14 @@
   <p:sldIdLst>
     <p:sldId id="256" r:id="rId2"/>
     <p:sldId id="258" r:id="rId3"/>
-    <p:sldId id="257" r:id="rId4"/>
+    <p:sldId id="259" r:id="rId4"/>
+    <p:sldId id="260" r:id="rId5"/>
+    <p:sldId id="262" r:id="rId6"/>
+    <p:sldId id="266" r:id="rId7"/>
+    <p:sldId id="261" r:id="rId8"/>
+    <p:sldId id="263" r:id="rId9"/>
+    <p:sldId id="264" r:id="rId10"/>
+    <p:sldId id="265" r:id="rId11"/>
   </p:sldIdLst>
   <p:sldSz cx="12192000" cy="6858000"/>
   <p:notesSz cx="6858000" cy="9144000"/>
@@ -106,6 +113,11 @@
       </a:defRPr>
     </a:lvl9pPr>
   </p:defaultTextStyle>
+  <p:extLst>
+    <p:ext uri="{EFAFB233-063F-42B5-8137-9DF3F51BA10A}">
+      <p15:sldGuideLst xmlns:p15="http://schemas.microsoft.com/office/powerpoint/2012/main"/>
+    </p:ext>
+  </p:extLst>
 </p:presentation>
 </file>
 
@@ -2983,7 +2995,7 @@
           <a:p>
             <a:r>
               <a:rPr lang="en-US" dirty="0" smtClean="0"/>
-              <a:t>OS PROJECT</a:t>
+              <a:t>Project Guardian</a:t>
             </a:r>
             <a:endParaRPr lang="en-US" dirty="0"/>
           </a:p>
@@ -3022,6 +3034,94 @@
     <p:extLst>
       <p:ext uri="{BB962C8B-B14F-4D97-AF65-F5344CB8AC3E}">
         <p14:creationId xmlns:p14="http://schemas.microsoft.com/office/powerpoint/2010/main" val="3605779628"/>
+      </p:ext>
+    </p:extLst>
+  </p:cSld>
+  <p:clrMapOvr>
+    <a:masterClrMapping/>
+  </p:clrMapOvr>
+</p:sld>
+</file>
+
+<file path=ppt/slides/slide10.xml><?xml version="1.0" encoding="utf-8"?>
+<p:sld xmlns:a="http://schemas.openxmlformats.org/drawingml/2006/main" xmlns:r="http://schemas.openxmlformats.org/officeDocument/2006/relationships" xmlns:p="http://schemas.openxmlformats.org/presentationml/2006/main">
+  <p:cSld>
+    <p:spTree>
+      <p:nvGrpSpPr>
+        <p:cNvPr id="1" name=""/>
+        <p:cNvGrpSpPr/>
+        <p:nvPr/>
+      </p:nvGrpSpPr>
+      <p:grpSpPr>
+        <a:xfrm>
+          <a:off x="0" y="0"/>
+          <a:ext cx="0" cy="0"/>
+          <a:chOff x="0" y="0"/>
+          <a:chExt cx="0" cy="0"/>
+        </a:xfrm>
+      </p:grpSpPr>
+      <p:sp>
+        <p:nvSpPr>
+          <p:cNvPr id="2" name="Title 1"/>
+          <p:cNvSpPr>
+            <a:spLocks noGrp="1"/>
+          </p:cNvSpPr>
+          <p:nvPr>
+            <p:ph type="title"/>
+          </p:nvPr>
+        </p:nvSpPr>
+        <p:spPr/>
+        <p:txBody>
+          <a:bodyPr/>
+          <a:lstStyle/>
+          <a:p>
+            <a:r>
+              <a:rPr lang="en-US" dirty="0" smtClean="0"/>
+              <a:t>Phase 3: </a:t>
+            </a:r>
+            <a:r>
+              <a:rPr lang="en-US" dirty="0"/>
+              <a:t>Quadcopter Design</a:t>
+            </a:r>
+            <a:br>
+              <a:rPr lang="en-US" dirty="0"/>
+            </a:br>
+            <a:endParaRPr lang="en-US" dirty="0"/>
+          </a:p>
+        </p:txBody>
+      </p:sp>
+      <p:sp>
+        <p:nvSpPr>
+          <p:cNvPr id="3" name="Content Placeholder 2"/>
+          <p:cNvSpPr>
+            <a:spLocks noGrp="1"/>
+          </p:cNvSpPr>
+          <p:nvPr>
+            <p:ph idx="1"/>
+          </p:nvPr>
+        </p:nvSpPr>
+        <p:spPr/>
+        <p:txBody>
+          <a:bodyPr/>
+          <a:lstStyle/>
+          <a:p>
+            <a:r>
+              <a:rPr lang="en-US" dirty="0" smtClean="0"/>
+              <a:t>Mechanical Design</a:t>
+            </a:r>
+          </a:p>
+          <a:p>
+            <a:r>
+              <a:rPr lang="en-US" dirty="0" smtClean="0"/>
+              <a:t>Power Design</a:t>
+            </a:r>
+          </a:p>
+        </p:txBody>
+      </p:sp>
+    </p:spTree>
+    <p:extLst>
+      <p:ext uri="{BB962C8B-B14F-4D97-AF65-F5344CB8AC3E}">
+        <p14:creationId xmlns:p14="http://schemas.microsoft.com/office/powerpoint/2010/main" val="778537469"/>
       </p:ext>
     </p:extLst>
   </p:cSld>
@@ -3065,7 +3165,7 @@
           <a:p>
             <a:r>
               <a:rPr lang="en-US" dirty="0" smtClean="0"/>
-              <a:t>Motivation</a:t>
+              <a:t>Program Motivation</a:t>
             </a:r>
             <a:endParaRPr lang="en-US" dirty="0"/>
           </a:p>
@@ -3083,14 +3183,120 @@
         </p:nvSpPr>
         <p:spPr/>
         <p:txBody>
-          <a:bodyPr/>
-          <a:lstStyle/>
-          <a:p>
-            <a:r>
-              <a:rPr lang="en-US" dirty="0" smtClean="0"/>
-              <a:t>Provide a learning</a:t>
-            </a:r>
-            <a:endParaRPr lang="en-US" dirty="0"/>
+          <a:bodyPr>
+            <a:normAutofit lnSpcReduction="10000"/>
+          </a:bodyPr>
+          <a:lstStyle/>
+          <a:p>
+            <a:r>
+              <a:rPr lang="en-US" dirty="0" smtClean="0"/>
+              <a:t>Provide </a:t>
+            </a:r>
+            <a:r>
+              <a:rPr lang="en-US" dirty="0" smtClean="0"/>
+              <a:t>an opportunity to develop skills these areas:</a:t>
+            </a:r>
+          </a:p>
+          <a:p>
+            <a:pPr lvl="1"/>
+            <a:r>
+              <a:rPr lang="en-US" dirty="0" smtClean="0"/>
+              <a:t>Embedded Systems</a:t>
+            </a:r>
+          </a:p>
+          <a:p>
+            <a:pPr lvl="2"/>
+            <a:r>
+              <a:rPr lang="en-US" dirty="0" smtClean="0"/>
+              <a:t>Real-time Operating Systems</a:t>
+            </a:r>
+          </a:p>
+          <a:p>
+            <a:pPr lvl="2"/>
+            <a:r>
+              <a:rPr lang="en-US" dirty="0" smtClean="0"/>
+              <a:t>C and Assembly </a:t>
+            </a:r>
+            <a:r>
+              <a:rPr lang="en-US" dirty="0"/>
+              <a:t>P</a:t>
+            </a:r>
+            <a:r>
+              <a:rPr lang="en-US" dirty="0" smtClean="0"/>
+              <a:t>rogramming </a:t>
+            </a:r>
+            <a:r>
+              <a:rPr lang="en-US" dirty="0"/>
+              <a:t>S</a:t>
+            </a:r>
+            <a:r>
+              <a:rPr lang="en-US" dirty="0" smtClean="0"/>
+              <a:t>kills</a:t>
+            </a:r>
+          </a:p>
+          <a:p>
+            <a:pPr lvl="2"/>
+            <a:r>
+              <a:rPr lang="en-US" dirty="0" smtClean="0"/>
+              <a:t>SW Development Tools</a:t>
+            </a:r>
+          </a:p>
+          <a:p>
+            <a:pPr lvl="2"/>
+            <a:r>
+              <a:rPr lang="en-US" dirty="0" smtClean="0"/>
+              <a:t>DSP and Controls applications</a:t>
+            </a:r>
+            <a:endParaRPr lang="en-US" dirty="0" smtClean="0"/>
+          </a:p>
+          <a:p>
+            <a:pPr lvl="1"/>
+            <a:r>
+              <a:rPr lang="en-US" dirty="0" smtClean="0"/>
+              <a:t>Hardware and Software Integration</a:t>
+            </a:r>
+          </a:p>
+          <a:p>
+            <a:pPr lvl="2"/>
+            <a:r>
+              <a:rPr lang="en-US" dirty="0" smtClean="0"/>
+              <a:t>Desktop and Mobile Applications</a:t>
+            </a:r>
+          </a:p>
+          <a:p>
+            <a:pPr lvl="2"/>
+            <a:r>
+              <a:rPr lang="en-US" dirty="0" smtClean="0"/>
+              <a:t>Motor Drives and Power Electronics</a:t>
+            </a:r>
+          </a:p>
+          <a:p>
+            <a:pPr lvl="2"/>
+            <a:r>
+              <a:rPr lang="en-US" dirty="0" smtClean="0"/>
+              <a:t>Sensor Interfacing</a:t>
+            </a:r>
+          </a:p>
+          <a:p>
+            <a:pPr lvl="2"/>
+            <a:r>
+              <a:rPr lang="en-US" dirty="0" smtClean="0"/>
+              <a:t>PCB Design and Layout</a:t>
+            </a:r>
+          </a:p>
+          <a:p>
+            <a:pPr lvl="1"/>
+            <a:r>
+              <a:rPr lang="en-US" dirty="0" smtClean="0"/>
+              <a:t>Systems Engineering</a:t>
+            </a:r>
+          </a:p>
+          <a:p>
+            <a:pPr lvl="2"/>
+            <a:r>
+              <a:rPr lang="en-US" dirty="0" smtClean="0"/>
+              <a:t>Specifications</a:t>
+            </a:r>
           </a:p>
         </p:txBody>
       </p:sp>
@@ -3141,7 +3347,7 @@
           <a:p>
             <a:r>
               <a:rPr lang="en-US" dirty="0" smtClean="0"/>
-              <a:t>User Interface Goals</a:t>
+              <a:t>Deliverables</a:t>
             </a:r>
             <a:endParaRPr lang="en-US" dirty="0"/>
           </a:p>
@@ -3159,47 +3365,82 @@
         </p:nvSpPr>
         <p:spPr/>
         <p:txBody>
-          <a:bodyPr/>
-          <a:lstStyle/>
-          <a:p>
-            <a:r>
-              <a:rPr lang="en-US" dirty="0" smtClean="0"/>
-              <a:t>Short term: Implement a terminal user interface that resembles Linux terminal.</a:t>
+          <a:bodyPr>
+            <a:normAutofit fontScale="92500" lnSpcReduction="10000"/>
+          </a:bodyPr>
+          <a:lstStyle/>
+          <a:p>
+            <a:r>
+              <a:rPr lang="en-US" dirty="0" smtClean="0"/>
+              <a:t>Become a competent embedded software developer</a:t>
+            </a:r>
+          </a:p>
+          <a:p>
+            <a:r>
+              <a:rPr lang="en-US" dirty="0" smtClean="0"/>
+              <a:t>Increase HW and SW integration knowledge</a:t>
+            </a:r>
+          </a:p>
+          <a:p>
+            <a:r>
+              <a:rPr lang="en-US" dirty="0" smtClean="0"/>
+              <a:t>Be able to apply DSP and Algorithms to real-world problems</a:t>
+            </a:r>
+          </a:p>
+          <a:p>
+            <a:r>
+              <a:rPr lang="en-US" dirty="0" smtClean="0"/>
+              <a:t>Increase software troubleshooting competency</a:t>
+            </a:r>
+          </a:p>
+          <a:p>
+            <a:r>
+              <a:rPr lang="en-US" dirty="0" smtClean="0"/>
+              <a:t>Autonomous Guardian Quadcopter</a:t>
             </a:r>
           </a:p>
           <a:p>
             <a:pPr lvl="1"/>
             <a:r>
               <a:rPr lang="en-US" dirty="0" smtClean="0"/>
-              <a:t>Command history functionality</a:t>
+              <a:t>Smart sensing capabilities</a:t>
             </a:r>
           </a:p>
           <a:p>
             <a:pPr lvl="1"/>
             <a:r>
               <a:rPr lang="en-US" dirty="0" smtClean="0"/>
-              <a:t>System profiling tools</a:t>
+              <a:t>Auto docking and recharging</a:t>
             </a:r>
           </a:p>
           <a:p>
             <a:pPr lvl="1"/>
             <a:r>
-              <a:rPr lang="en-US" dirty="0" err="1" smtClean="0"/>
-              <a:t>etc</a:t>
-            </a:r>
-            <a:endParaRPr lang="en-US" dirty="0" smtClean="0"/>
-          </a:p>
-          <a:p>
-            <a:r>
-              <a:rPr lang="en-US" dirty="0" smtClean="0"/>
-              <a:t>Long term: migrate terminal UI to C# GUI.</a:t>
-            </a:r>
-          </a:p>
-          <a:p>
-            <a:r>
-              <a:rPr lang="en-US" dirty="0" smtClean="0"/>
-              <a:t>Long term: migrate terminal UI to mobile GUI.</a:t>
-            </a:r>
+              <a:rPr lang="en-US" dirty="0" smtClean="0"/>
+              <a:t>Mobile phone status monitor and manual overwrite</a:t>
+            </a:r>
+          </a:p>
+          <a:p>
+            <a:pPr lvl="1"/>
+            <a:r>
+              <a:rPr lang="en-US" dirty="0" smtClean="0"/>
+              <a:t>Cloud computing</a:t>
+            </a:r>
+          </a:p>
+          <a:p>
+            <a:r>
+              <a:rPr lang="en-US" dirty="0" smtClean="0"/>
+              <a:t>Design verification</a:t>
+            </a:r>
+          </a:p>
+          <a:p>
+            <a:pPr lvl="1"/>
+            <a:r>
+              <a:rPr lang="en-US" dirty="0" smtClean="0"/>
+              <a:t> Develop test bench to verify design.</a:t>
+            </a:r>
+          </a:p>
+          <a:p>
             <a:endParaRPr lang="en-US" dirty="0"/>
           </a:p>
         </p:txBody>
@@ -3207,7 +3448,717 @@
     </p:spTree>
     <p:extLst>
       <p:ext uri="{BB962C8B-B14F-4D97-AF65-F5344CB8AC3E}">
-        <p14:creationId xmlns:p14="http://schemas.microsoft.com/office/powerpoint/2010/main" val="488615179"/>
+        <p14:creationId xmlns:p14="http://schemas.microsoft.com/office/powerpoint/2010/main" val="15271048"/>
+      </p:ext>
+    </p:extLst>
+  </p:cSld>
+  <p:clrMapOvr>
+    <a:masterClrMapping/>
+  </p:clrMapOvr>
+</p:sld>
+</file>
+
+<file path=ppt/slides/slide4.xml><?xml version="1.0" encoding="utf-8"?>
+<p:sld xmlns:a="http://schemas.openxmlformats.org/drawingml/2006/main" xmlns:r="http://schemas.openxmlformats.org/officeDocument/2006/relationships" xmlns:p="http://schemas.openxmlformats.org/presentationml/2006/main">
+  <p:cSld>
+    <p:spTree>
+      <p:nvGrpSpPr>
+        <p:cNvPr id="1" name=""/>
+        <p:cNvGrpSpPr/>
+        <p:nvPr/>
+      </p:nvGrpSpPr>
+      <p:grpSpPr>
+        <a:xfrm>
+          <a:off x="0" y="0"/>
+          <a:ext cx="0" cy="0"/>
+          <a:chOff x="0" y="0"/>
+          <a:chExt cx="0" cy="0"/>
+        </a:xfrm>
+      </p:grpSpPr>
+      <p:sp>
+        <p:nvSpPr>
+          <p:cNvPr id="2" name="Title 1"/>
+          <p:cNvSpPr>
+            <a:spLocks noGrp="1"/>
+          </p:cNvSpPr>
+          <p:nvPr>
+            <p:ph type="title"/>
+          </p:nvPr>
+        </p:nvSpPr>
+        <p:spPr/>
+        <p:txBody>
+          <a:bodyPr/>
+          <a:lstStyle/>
+          <a:p>
+            <a:r>
+              <a:rPr lang="en-US" dirty="0" smtClean="0"/>
+              <a:t>System Engineering</a:t>
+            </a:r>
+            <a:endParaRPr lang="en-US" dirty="0"/>
+          </a:p>
+        </p:txBody>
+      </p:sp>
+      <p:pic>
+        <p:nvPicPr>
+          <p:cNvPr id="6" name="Content Placeholder 5"/>
+          <p:cNvPicPr>
+            <a:picLocks noGrp="1" noChangeAspect="1"/>
+          </p:cNvPicPr>
+          <p:nvPr>
+            <p:ph idx="1"/>
+          </p:nvPr>
+        </p:nvPicPr>
+        <p:blipFill>
+          <a:blip r:embed="rId2"/>
+          <a:stretch>
+            <a:fillRect/>
+          </a:stretch>
+        </p:blipFill>
+        <p:spPr>
+          <a:xfrm>
+            <a:off x="5266275" y="2433294"/>
+            <a:ext cx="1659450" cy="3136000"/>
+          </a:xfrm>
+          <a:prstGeom prst="rect">
+            <a:avLst/>
+          </a:prstGeom>
+        </p:spPr>
+      </p:pic>
+    </p:spTree>
+    <p:extLst>
+      <p:ext uri="{BB962C8B-B14F-4D97-AF65-F5344CB8AC3E}">
+        <p14:creationId xmlns:p14="http://schemas.microsoft.com/office/powerpoint/2010/main" val="1326746600"/>
+      </p:ext>
+    </p:extLst>
+  </p:cSld>
+  <p:clrMapOvr>
+    <a:masterClrMapping/>
+  </p:clrMapOvr>
+</p:sld>
+</file>
+
+<file path=ppt/slides/slide5.xml><?xml version="1.0" encoding="utf-8"?>
+<p:sld xmlns:a="http://schemas.openxmlformats.org/drawingml/2006/main" xmlns:r="http://schemas.openxmlformats.org/officeDocument/2006/relationships" xmlns:p="http://schemas.openxmlformats.org/presentationml/2006/main">
+  <p:cSld>
+    <p:spTree>
+      <p:nvGrpSpPr>
+        <p:cNvPr id="1" name=""/>
+        <p:cNvGrpSpPr/>
+        <p:nvPr/>
+      </p:nvGrpSpPr>
+      <p:grpSpPr>
+        <a:xfrm>
+          <a:off x="0" y="0"/>
+          <a:ext cx="0" cy="0"/>
+          <a:chOff x="0" y="0"/>
+          <a:chExt cx="0" cy="0"/>
+        </a:xfrm>
+      </p:grpSpPr>
+      <p:sp>
+        <p:nvSpPr>
+          <p:cNvPr id="2" name="Title 1"/>
+          <p:cNvSpPr>
+            <a:spLocks noGrp="1"/>
+          </p:cNvSpPr>
+          <p:nvPr>
+            <p:ph type="title"/>
+          </p:nvPr>
+        </p:nvSpPr>
+        <p:spPr/>
+        <p:txBody>
+          <a:bodyPr/>
+          <a:lstStyle/>
+          <a:p>
+            <a:r>
+              <a:rPr lang="en-US" dirty="0" smtClean="0"/>
+              <a:t>Planning</a:t>
+            </a:r>
+            <a:endParaRPr lang="en-US" dirty="0"/>
+          </a:p>
+        </p:txBody>
+      </p:sp>
+      <p:sp>
+        <p:nvSpPr>
+          <p:cNvPr id="3" name="Content Placeholder 2"/>
+          <p:cNvSpPr>
+            <a:spLocks noGrp="1"/>
+          </p:cNvSpPr>
+          <p:nvPr>
+            <p:ph sz="half" idx="1"/>
+          </p:nvPr>
+        </p:nvSpPr>
+        <p:spPr/>
+        <p:txBody>
+          <a:bodyPr>
+            <a:normAutofit/>
+          </a:bodyPr>
+          <a:lstStyle/>
+          <a:p>
+            <a:r>
+              <a:rPr lang="en-US" dirty="0"/>
+              <a:t>User Interface (UI) </a:t>
+            </a:r>
+            <a:r>
+              <a:rPr lang="en-US" dirty="0" smtClean="0"/>
+              <a:t>Goals</a:t>
+            </a:r>
+          </a:p>
+          <a:p>
+            <a:pPr lvl="1"/>
+            <a:r>
+              <a:rPr lang="en-US" dirty="0"/>
+              <a:t>Short term: Implement a terminal user interface that resembles Linux terminal.</a:t>
+            </a:r>
+          </a:p>
+          <a:p>
+            <a:pPr lvl="2"/>
+            <a:r>
+              <a:rPr lang="en-US" dirty="0"/>
+              <a:t>Command history functionality</a:t>
+            </a:r>
+          </a:p>
+          <a:p>
+            <a:pPr lvl="2"/>
+            <a:r>
+              <a:rPr lang="en-US" dirty="0"/>
+              <a:t>System profiling tools</a:t>
+            </a:r>
+          </a:p>
+          <a:p>
+            <a:pPr lvl="2"/>
+            <a:r>
+              <a:rPr lang="en-US" dirty="0" err="1"/>
+              <a:t>etc</a:t>
+            </a:r>
+            <a:endParaRPr lang="en-US" dirty="0"/>
+          </a:p>
+          <a:p>
+            <a:pPr lvl="1"/>
+            <a:r>
+              <a:rPr lang="en-US" dirty="0"/>
+              <a:t>Long term: migrate terminal UI to C# GUI.</a:t>
+            </a:r>
+          </a:p>
+          <a:p>
+            <a:pPr lvl="1"/>
+            <a:r>
+              <a:rPr lang="en-US" dirty="0"/>
+              <a:t>Long term: migrate terminal UI to mobile GUI.</a:t>
+            </a:r>
+          </a:p>
+          <a:p>
+            <a:pPr lvl="1"/>
+            <a:endParaRPr lang="en-US" dirty="0"/>
+          </a:p>
+        </p:txBody>
+      </p:sp>
+      <p:sp>
+        <p:nvSpPr>
+          <p:cNvPr id="4" name="Content Placeholder 3"/>
+          <p:cNvSpPr>
+            <a:spLocks noGrp="1"/>
+          </p:cNvSpPr>
+          <p:nvPr>
+            <p:ph sz="half" idx="2"/>
+          </p:nvPr>
+        </p:nvSpPr>
+        <p:spPr/>
+        <p:txBody>
+          <a:bodyPr>
+            <a:normAutofit/>
+          </a:bodyPr>
+          <a:lstStyle/>
+          <a:p>
+            <a:r>
+              <a:rPr lang="en-US" dirty="0" smtClean="0"/>
+              <a:t>Robot/Quadcopter Goals</a:t>
+            </a:r>
+          </a:p>
+          <a:p>
+            <a:pPr lvl="1"/>
+            <a:r>
+              <a:rPr lang="en-US" dirty="0" smtClean="0"/>
+              <a:t>Short term: enable basic movements and wireless communication functionality</a:t>
+            </a:r>
+          </a:p>
+          <a:p>
+            <a:pPr lvl="1"/>
+            <a:r>
+              <a:rPr lang="en-US" dirty="0" smtClean="0"/>
+              <a:t>Long term: implement smart controls algorithms</a:t>
+            </a:r>
+          </a:p>
+          <a:p>
+            <a:pPr lvl="1"/>
+            <a:r>
+              <a:rPr lang="en-US" dirty="0" smtClean="0"/>
+              <a:t>Long term: autonomous quadcopter scouting interior space (guardian)</a:t>
+            </a:r>
+            <a:endParaRPr lang="en-US" dirty="0"/>
+          </a:p>
+        </p:txBody>
+      </p:sp>
+    </p:spTree>
+    <p:extLst>
+      <p:ext uri="{BB962C8B-B14F-4D97-AF65-F5344CB8AC3E}">
+        <p14:creationId xmlns:p14="http://schemas.microsoft.com/office/powerpoint/2010/main" val="3300388588"/>
+      </p:ext>
+    </p:extLst>
+  </p:cSld>
+  <p:clrMapOvr>
+    <a:masterClrMapping/>
+  </p:clrMapOvr>
+</p:sld>
+</file>
+
+<file path=ppt/slides/slide6.xml><?xml version="1.0" encoding="utf-8"?>
+<p:sld xmlns:a="http://schemas.openxmlformats.org/drawingml/2006/main" xmlns:r="http://schemas.openxmlformats.org/officeDocument/2006/relationships" xmlns:p="http://schemas.openxmlformats.org/presentationml/2006/main">
+  <p:cSld>
+    <p:spTree>
+      <p:nvGrpSpPr>
+        <p:cNvPr id="1" name=""/>
+        <p:cNvGrpSpPr/>
+        <p:nvPr/>
+      </p:nvGrpSpPr>
+      <p:grpSpPr>
+        <a:xfrm>
+          <a:off x="0" y="0"/>
+          <a:ext cx="0" cy="0"/>
+          <a:chOff x="0" y="0"/>
+          <a:chExt cx="0" cy="0"/>
+        </a:xfrm>
+      </p:grpSpPr>
+      <p:sp>
+        <p:nvSpPr>
+          <p:cNvPr id="2" name="Title 1"/>
+          <p:cNvSpPr>
+            <a:spLocks noGrp="1"/>
+          </p:cNvSpPr>
+          <p:nvPr>
+            <p:ph type="title"/>
+          </p:nvPr>
+        </p:nvSpPr>
+        <p:spPr/>
+        <p:txBody>
+          <a:bodyPr/>
+          <a:lstStyle/>
+          <a:p>
+            <a:r>
+              <a:rPr lang="en-US" dirty="0" smtClean="0"/>
+              <a:t>Planning </a:t>
+            </a:r>
+            <a:endParaRPr lang="en-US" dirty="0"/>
+          </a:p>
+        </p:txBody>
+      </p:sp>
+      <p:sp>
+        <p:nvSpPr>
+          <p:cNvPr id="3" name="Content Placeholder 2"/>
+          <p:cNvSpPr>
+            <a:spLocks noGrp="1"/>
+          </p:cNvSpPr>
+          <p:nvPr>
+            <p:ph sz="half" idx="1"/>
+          </p:nvPr>
+        </p:nvSpPr>
+        <p:spPr/>
+        <p:txBody>
+          <a:bodyPr/>
+          <a:lstStyle/>
+          <a:p>
+            <a:r>
+              <a:rPr lang="en-US" dirty="0" smtClean="0"/>
+              <a:t>Budget</a:t>
+            </a:r>
+          </a:p>
+          <a:p>
+            <a:pPr lvl="1"/>
+            <a:r>
+              <a:rPr lang="en-US" dirty="0" smtClean="0"/>
+              <a:t>Financial </a:t>
+            </a:r>
+          </a:p>
+          <a:p>
+            <a:pPr lvl="2"/>
+            <a:r>
+              <a:rPr lang="en-US" dirty="0" smtClean="0"/>
+              <a:t>5k Max</a:t>
+            </a:r>
+          </a:p>
+          <a:p>
+            <a:pPr lvl="2"/>
+            <a:r>
+              <a:rPr lang="en-US" dirty="0" smtClean="0"/>
+              <a:t>2-3k Target</a:t>
+            </a:r>
+          </a:p>
+          <a:p>
+            <a:pPr lvl="1"/>
+            <a:r>
+              <a:rPr lang="en-US" dirty="0" smtClean="0"/>
+              <a:t>Time</a:t>
+            </a:r>
+          </a:p>
+          <a:p>
+            <a:pPr lvl="2"/>
+            <a:r>
+              <a:rPr lang="en-US" dirty="0" smtClean="0"/>
+              <a:t>10-20 </a:t>
+            </a:r>
+            <a:r>
+              <a:rPr lang="en-US" dirty="0" err="1" smtClean="0"/>
+              <a:t>hrs</a:t>
+            </a:r>
+            <a:r>
+              <a:rPr lang="en-US" dirty="0" smtClean="0"/>
+              <a:t>/</a:t>
+            </a:r>
+            <a:r>
+              <a:rPr lang="en-US" dirty="0" err="1" smtClean="0"/>
+              <a:t>wk</a:t>
+            </a:r>
+            <a:endParaRPr lang="en-US" dirty="0" smtClean="0"/>
+          </a:p>
+          <a:p>
+            <a:pPr lvl="2"/>
+            <a:r>
+              <a:rPr lang="en-US" dirty="0" smtClean="0"/>
+              <a:t>2 years of R/D (~2000 </a:t>
+            </a:r>
+            <a:r>
+              <a:rPr lang="en-US" dirty="0" err="1" smtClean="0"/>
+              <a:t>hrs</a:t>
+            </a:r>
+            <a:r>
+              <a:rPr lang="en-US" dirty="0" smtClean="0"/>
+              <a:t> or 80k equivalent)</a:t>
+            </a:r>
+          </a:p>
+          <a:p>
+            <a:pPr lvl="2"/>
+            <a:endParaRPr lang="en-US" dirty="0" smtClean="0"/>
+          </a:p>
+          <a:p>
+            <a:pPr lvl="2"/>
+            <a:endParaRPr lang="en-US" dirty="0"/>
+          </a:p>
+        </p:txBody>
+      </p:sp>
+      <p:sp>
+        <p:nvSpPr>
+          <p:cNvPr id="4" name="Content Placeholder 3"/>
+          <p:cNvSpPr>
+            <a:spLocks noGrp="1"/>
+          </p:cNvSpPr>
+          <p:nvPr>
+            <p:ph sz="half" idx="2"/>
+          </p:nvPr>
+        </p:nvSpPr>
+        <p:spPr/>
+        <p:txBody>
+          <a:bodyPr/>
+          <a:lstStyle/>
+          <a:p>
+            <a:pPr marL="0" indent="0">
+              <a:buNone/>
+            </a:pPr>
+            <a:endParaRPr lang="en-US" dirty="0"/>
+          </a:p>
+        </p:txBody>
+      </p:sp>
+    </p:spTree>
+    <p:extLst>
+      <p:ext uri="{BB962C8B-B14F-4D97-AF65-F5344CB8AC3E}">
+        <p14:creationId xmlns:p14="http://schemas.microsoft.com/office/powerpoint/2010/main" val="908680300"/>
+      </p:ext>
+    </p:extLst>
+  </p:cSld>
+  <p:clrMapOvr>
+    <a:masterClrMapping/>
+  </p:clrMapOvr>
+</p:sld>
+</file>
+
+<file path=ppt/slides/slide7.xml><?xml version="1.0" encoding="utf-8"?>
+<p:sld xmlns:a="http://schemas.openxmlformats.org/drawingml/2006/main" xmlns:r="http://schemas.openxmlformats.org/officeDocument/2006/relationships" xmlns:p="http://schemas.openxmlformats.org/presentationml/2006/main">
+  <p:cSld>
+    <p:spTree>
+      <p:nvGrpSpPr>
+        <p:cNvPr id="1" name=""/>
+        <p:cNvGrpSpPr/>
+        <p:nvPr/>
+      </p:nvGrpSpPr>
+      <p:grpSpPr>
+        <a:xfrm>
+          <a:off x="0" y="0"/>
+          <a:ext cx="0" cy="0"/>
+          <a:chOff x="0" y="0"/>
+          <a:chExt cx="0" cy="0"/>
+        </a:xfrm>
+      </p:grpSpPr>
+      <p:sp>
+        <p:nvSpPr>
+          <p:cNvPr id="2" name="Title 1"/>
+          <p:cNvSpPr>
+            <a:spLocks noGrp="1"/>
+          </p:cNvSpPr>
+          <p:nvPr>
+            <p:ph type="title"/>
+          </p:nvPr>
+        </p:nvSpPr>
+        <p:spPr/>
+        <p:txBody>
+          <a:bodyPr/>
+          <a:lstStyle/>
+          <a:p>
+            <a:r>
+              <a:rPr lang="en-US" dirty="0" smtClean="0"/>
+              <a:t>Phase 0: UI Development</a:t>
+            </a:r>
+            <a:endParaRPr lang="en-US" dirty="0"/>
+          </a:p>
+        </p:txBody>
+      </p:sp>
+      <p:sp>
+        <p:nvSpPr>
+          <p:cNvPr id="3" name="Content Placeholder 2"/>
+          <p:cNvSpPr>
+            <a:spLocks noGrp="1"/>
+          </p:cNvSpPr>
+          <p:nvPr>
+            <p:ph idx="1"/>
+          </p:nvPr>
+        </p:nvSpPr>
+        <p:spPr/>
+        <p:txBody>
+          <a:bodyPr/>
+          <a:lstStyle/>
+          <a:p>
+            <a:r>
+              <a:rPr lang="en-US" dirty="0" smtClean="0"/>
+              <a:t>Linux-like UI</a:t>
+            </a:r>
+          </a:p>
+          <a:p>
+            <a:r>
+              <a:rPr lang="en-US" dirty="0" smtClean="0"/>
+              <a:t>Robust UI</a:t>
+            </a:r>
+          </a:p>
+          <a:p>
+            <a:r>
+              <a:rPr lang="en-US" dirty="0" smtClean="0"/>
+              <a:t>User friendly</a:t>
+            </a:r>
+            <a:endParaRPr lang="en-US" dirty="0"/>
+          </a:p>
+        </p:txBody>
+      </p:sp>
+    </p:spTree>
+    <p:extLst>
+      <p:ext uri="{BB962C8B-B14F-4D97-AF65-F5344CB8AC3E}">
+        <p14:creationId xmlns:p14="http://schemas.microsoft.com/office/powerpoint/2010/main" val="1418918666"/>
+      </p:ext>
+    </p:extLst>
+  </p:cSld>
+  <p:clrMapOvr>
+    <a:masterClrMapping/>
+  </p:clrMapOvr>
+</p:sld>
+</file>
+
+<file path=ppt/slides/slide8.xml><?xml version="1.0" encoding="utf-8"?>
+<p:sld xmlns:a="http://schemas.openxmlformats.org/drawingml/2006/main" xmlns:r="http://schemas.openxmlformats.org/officeDocument/2006/relationships" xmlns:p="http://schemas.openxmlformats.org/presentationml/2006/main">
+  <p:cSld>
+    <p:spTree>
+      <p:nvGrpSpPr>
+        <p:cNvPr id="1" name=""/>
+        <p:cNvGrpSpPr/>
+        <p:nvPr/>
+      </p:nvGrpSpPr>
+      <p:grpSpPr>
+        <a:xfrm>
+          <a:off x="0" y="0"/>
+          <a:ext cx="0" cy="0"/>
+          <a:chOff x="0" y="0"/>
+          <a:chExt cx="0" cy="0"/>
+        </a:xfrm>
+      </p:grpSpPr>
+      <p:sp>
+        <p:nvSpPr>
+          <p:cNvPr id="2" name="Title 1"/>
+          <p:cNvSpPr>
+            <a:spLocks noGrp="1"/>
+          </p:cNvSpPr>
+          <p:nvPr>
+            <p:ph type="title"/>
+          </p:nvPr>
+        </p:nvSpPr>
+        <p:spPr/>
+        <p:txBody>
+          <a:bodyPr/>
+          <a:lstStyle/>
+          <a:p>
+            <a:r>
+              <a:rPr lang="en-US" dirty="0" smtClean="0"/>
+              <a:t>Phase 1: Operating System</a:t>
+            </a:r>
+            <a:endParaRPr lang="en-US" dirty="0"/>
+          </a:p>
+        </p:txBody>
+      </p:sp>
+      <p:sp>
+        <p:nvSpPr>
+          <p:cNvPr id="3" name="Content Placeholder 2"/>
+          <p:cNvSpPr>
+            <a:spLocks noGrp="1"/>
+          </p:cNvSpPr>
+          <p:nvPr>
+            <p:ph idx="1"/>
+          </p:nvPr>
+        </p:nvSpPr>
+        <p:spPr/>
+        <p:txBody>
+          <a:bodyPr/>
+          <a:lstStyle/>
+          <a:p>
+            <a:r>
+              <a:rPr lang="en-US" dirty="0" smtClean="0"/>
+              <a:t>Basic Preemptive Operating System</a:t>
+            </a:r>
+          </a:p>
+          <a:p>
+            <a:pPr lvl="1"/>
+            <a:r>
+              <a:rPr lang="en-US" dirty="0" smtClean="0"/>
+              <a:t>TCB with priority and aging.</a:t>
+            </a:r>
+          </a:p>
+          <a:p>
+            <a:pPr lvl="1"/>
+            <a:r>
+              <a:rPr lang="en-US" dirty="0" smtClean="0"/>
+              <a:t>Basic I/O and ADC and DAC functionalities. </a:t>
+            </a:r>
+          </a:p>
+          <a:p>
+            <a:pPr lvl="1"/>
+            <a:r>
+              <a:rPr lang="en-US" dirty="0" smtClean="0"/>
+              <a:t>SD Memory Storage for Data Logging</a:t>
+            </a:r>
+          </a:p>
+          <a:p>
+            <a:pPr lvl="1"/>
+            <a:r>
+              <a:rPr lang="en-US" dirty="0" smtClean="0"/>
+              <a:t>LCD Display</a:t>
+            </a:r>
+            <a:endParaRPr lang="en-US" dirty="0"/>
+          </a:p>
+        </p:txBody>
+      </p:sp>
+    </p:spTree>
+    <p:extLst>
+      <p:ext uri="{BB962C8B-B14F-4D97-AF65-F5344CB8AC3E}">
+        <p14:creationId xmlns:p14="http://schemas.microsoft.com/office/powerpoint/2010/main" val="2045116794"/>
+      </p:ext>
+    </p:extLst>
+  </p:cSld>
+  <p:clrMapOvr>
+    <a:masterClrMapping/>
+  </p:clrMapOvr>
+</p:sld>
+</file>
+
+<file path=ppt/slides/slide9.xml><?xml version="1.0" encoding="utf-8"?>
+<p:sld xmlns:a="http://schemas.openxmlformats.org/drawingml/2006/main" xmlns:r="http://schemas.openxmlformats.org/officeDocument/2006/relationships" xmlns:p="http://schemas.openxmlformats.org/presentationml/2006/main">
+  <p:cSld>
+    <p:spTree>
+      <p:nvGrpSpPr>
+        <p:cNvPr id="1" name=""/>
+        <p:cNvGrpSpPr/>
+        <p:nvPr/>
+      </p:nvGrpSpPr>
+      <p:grpSpPr>
+        <a:xfrm>
+          <a:off x="0" y="0"/>
+          <a:ext cx="0" cy="0"/>
+          <a:chOff x="0" y="0"/>
+          <a:chExt cx="0" cy="0"/>
+        </a:xfrm>
+      </p:grpSpPr>
+      <p:sp>
+        <p:nvSpPr>
+          <p:cNvPr id="2" name="Title 1"/>
+          <p:cNvSpPr>
+            <a:spLocks noGrp="1"/>
+          </p:cNvSpPr>
+          <p:nvPr>
+            <p:ph type="title"/>
+          </p:nvPr>
+        </p:nvSpPr>
+        <p:spPr/>
+        <p:txBody>
+          <a:bodyPr/>
+          <a:lstStyle/>
+          <a:p>
+            <a:r>
+              <a:rPr lang="en-US" dirty="0" smtClean="0"/>
+              <a:t>Phase 2: Sensors</a:t>
+            </a:r>
+            <a:endParaRPr lang="en-US" dirty="0"/>
+          </a:p>
+        </p:txBody>
+      </p:sp>
+      <p:sp>
+        <p:nvSpPr>
+          <p:cNvPr id="3" name="Content Placeholder 2"/>
+          <p:cNvSpPr>
+            <a:spLocks noGrp="1"/>
+          </p:cNvSpPr>
+          <p:nvPr>
+            <p:ph idx="1"/>
+          </p:nvPr>
+        </p:nvSpPr>
+        <p:spPr/>
+        <p:txBody>
+          <a:bodyPr/>
+          <a:lstStyle/>
+          <a:p>
+            <a:r>
+              <a:rPr lang="en-US" dirty="0" smtClean="0"/>
+              <a:t>Sensors I/F</a:t>
+            </a:r>
+          </a:p>
+          <a:p>
+            <a:pPr lvl="1"/>
+            <a:r>
+              <a:rPr lang="en-US" dirty="0" smtClean="0"/>
+              <a:t>Test various sensors</a:t>
+            </a:r>
+          </a:p>
+          <a:p>
+            <a:pPr lvl="1"/>
+            <a:r>
+              <a:rPr lang="en-US" dirty="0" smtClean="0"/>
+              <a:t>Calibrate sensors</a:t>
+            </a:r>
+          </a:p>
+          <a:p>
+            <a:pPr lvl="1"/>
+            <a:r>
+              <a:rPr lang="en-US" dirty="0" smtClean="0"/>
+              <a:t>Sensor fusion</a:t>
+            </a:r>
+            <a:endParaRPr lang="en-US" dirty="0"/>
+          </a:p>
+        </p:txBody>
+      </p:sp>
+    </p:spTree>
+    <p:extLst>
+      <p:ext uri="{BB962C8B-B14F-4D97-AF65-F5344CB8AC3E}">
+        <p14:creationId xmlns:p14="http://schemas.microsoft.com/office/powerpoint/2010/main" val="846917306"/>
       </p:ext>
     </p:extLst>
   </p:cSld>

</xml_diff>